<commit_message>
some update for extract fragSize
</commit_message>
<xml_diff>
--- a/Week3/week3_cancer_fraction.pptx
+++ b/Week3/week3_cancer_fraction.pptx
@@ -5,13 +5,14 @@
     <p:sldMasterId id="2147483648" r:id="rId1"/>
   </p:sldMasterIdLst>
   <p:notesMasterIdLst>
-    <p:notesMasterId r:id="rId6"/>
+    <p:notesMasterId r:id="rId7"/>
   </p:notesMasterIdLst>
   <p:sldIdLst>
     <p:sldId id="257" r:id="rId2"/>
     <p:sldId id="264" r:id="rId3"/>
     <p:sldId id="265" r:id="rId4"/>
     <p:sldId id="266" r:id="rId5"/>
+    <p:sldId id="267" r:id="rId6"/>
   </p:sldIdLst>
   <p:sldSz cx="12192000" cy="6858000"/>
   <p:notesSz cx="6858000" cy="9144000"/>
@@ -821,6 +822,90 @@
         </p:spPr>
       </p:sp>
     </p:spTree>
+  </p:cSld>
+  <p:clrMapOvr>
+    <a:masterClrMapping/>
+  </p:clrMapOvr>
+</p:notes>
+</file>
+
+<file path=ppt/notesSlides/notesSlide4.xml><?xml version="1.0" encoding="utf-8"?>
+<p:notes xmlns:a="http://schemas.openxmlformats.org/drawingml/2006/main" xmlns:r="http://schemas.openxmlformats.org/officeDocument/2006/relationships" xmlns:p="http://schemas.openxmlformats.org/presentationml/2006/main">
+  <p:cSld>
+    <p:spTree>
+      <p:nvGrpSpPr>
+        <p:cNvPr id="1" name=""/>
+        <p:cNvGrpSpPr/>
+        <p:nvPr/>
+      </p:nvGrpSpPr>
+      <p:grpSpPr>
+        <a:xfrm>
+          <a:off x="0" y="0"/>
+          <a:ext cx="0" cy="0"/>
+          <a:chOff x="0" y="0"/>
+          <a:chExt cx="0" cy="0"/>
+        </a:xfrm>
+      </p:grpSpPr>
+      <p:sp>
+        <p:nvSpPr>
+          <p:cNvPr id="2" name="Slide Image Placeholder 1"/>
+          <p:cNvSpPr>
+            <a:spLocks noGrp="1" noRot="1" noChangeAspect="1"/>
+          </p:cNvSpPr>
+          <p:nvPr>
+            <p:ph type="sldImg"/>
+          </p:nvPr>
+        </p:nvSpPr>
+        <p:spPr/>
+      </p:sp>
+      <p:sp>
+        <p:nvSpPr>
+          <p:cNvPr id="3" name="Notes Placeholder 2"/>
+          <p:cNvSpPr>
+            <a:spLocks noGrp="1"/>
+          </p:cNvSpPr>
+          <p:nvPr>
+            <p:ph type="body" idx="1"/>
+          </p:nvPr>
+        </p:nvSpPr>
+        <p:spPr/>
+        <p:txBody>
+          <a:bodyPr/>
+          <a:lstStyle/>
+          <a:p>
+            <a:endParaRPr lang="en-US" dirty="0"/>
+          </a:p>
+        </p:txBody>
+      </p:sp>
+      <p:sp>
+        <p:nvSpPr>
+          <p:cNvPr id="4" name="Slide Number Placeholder 3"/>
+          <p:cNvSpPr>
+            <a:spLocks noGrp="1"/>
+          </p:cNvSpPr>
+          <p:nvPr>
+            <p:ph type="sldNum" sz="quarter" idx="5"/>
+          </p:nvPr>
+        </p:nvSpPr>
+        <p:spPr/>
+        <p:txBody>
+          <a:bodyPr/>
+          <a:lstStyle/>
+          <a:p>
+            <a:fld id="{1617A225-B4B5-3F43-81B5-0D7354876237}" type="slidenum">
+              <a:rPr lang="en-US" smtClean="0"/>
+              <a:t>4</a:t>
+            </a:fld>
+            <a:endParaRPr lang="en-US"/>
+          </a:p>
+        </p:txBody>
+      </p:sp>
+    </p:spTree>
+    <p:extLst>
+      <p:ext uri="{BB962C8B-B14F-4D97-AF65-F5344CB8AC3E}">
+        <p14:creationId xmlns:p14="http://schemas.microsoft.com/office/powerpoint/2010/main" val="2982621260"/>
+      </p:ext>
+    </p:extLst>
   </p:cSld>
   <p:clrMapOvr>
     <a:masterClrMapping/>
@@ -5219,6 +5304,262 @@
           </a:bodyPr>
           <a:lstStyle/>
           <a:p>
+            <a:pPr lvl="0">
+              <a:spcBef>
+                <a:spcPts val="0"/>
+              </a:spcBef>
+              <a:buSzPts val="2800"/>
+            </a:pPr>
+            <a:r>
+              <a:rPr lang="en-US" dirty="0">
+                <a:latin typeface="+mn-lt"/>
+              </a:rPr>
+              <a:t>Generate </a:t>
+            </a:r>
+            <a:r>
+              <a:rPr lang="en-US" dirty="0"/>
+              <a:t>Feature (Fragment Size): </a:t>
+            </a:r>
+            <a:endParaRPr lang="en-US" dirty="0">
+              <a:latin typeface="+mn-lt"/>
+            </a:endParaRPr>
+          </a:p>
+          <a:p>
+            <a:pPr marL="685800" lvl="1" indent="-228600">
+              <a:spcBef>
+                <a:spcPts val="0"/>
+              </a:spcBef>
+              <a:buSzPts val="2800"/>
+            </a:pPr>
+            <a:r>
+              <a:rPr lang="en-US" dirty="0">
+                <a:latin typeface="+mn-lt"/>
+              </a:rPr>
+              <a:t>(</a:t>
+            </a:r>
+            <a:r>
+              <a:rPr lang="en-US" dirty="0">
+                <a:solidFill>
+                  <a:srgbClr val="00B050"/>
+                </a:solidFill>
+                <a:latin typeface="+mn-lt"/>
+              </a:rPr>
+              <a:t>Done</a:t>
+            </a:r>
+            <a:r>
+              <a:rPr lang="en-US" dirty="0">
+                <a:latin typeface="+mn-lt"/>
+              </a:rPr>
+              <a:t>)Get a table of molecules fragment size distribution.</a:t>
+            </a:r>
+          </a:p>
+          <a:p>
+            <a:pPr marL="685800" lvl="1" indent="-228600">
+              <a:spcBef>
+                <a:spcPts val="0"/>
+              </a:spcBef>
+              <a:buSzPts val="2800"/>
+            </a:pPr>
+            <a:r>
+              <a:rPr lang="en-US" sz="1400" dirty="0">
+                <a:latin typeface="+mn-lt"/>
+                <a:hlinkClick r:id="rId3"/>
+              </a:rPr>
+              <a:t>https://github.com/guardant/data_science/blob/master/02_DEVELOPMENT/210503_FUSION_FRAGMENTOMICS/00_prepareData.R</a:t>
+            </a:r>
+            <a:endParaRPr lang="en-US" sz="1400" dirty="0">
+              <a:latin typeface="+mn-lt"/>
+            </a:endParaRPr>
+          </a:p>
+          <a:p>
+            <a:pPr lvl="1">
+              <a:spcBef>
+                <a:spcPts val="0"/>
+              </a:spcBef>
+              <a:buSzPts val="2800"/>
+            </a:pPr>
+            <a:r>
+              <a:rPr lang="en-US" sz="1800" dirty="0"/>
+              <a:t>Now working with test data, considering switch to full data set Soon.</a:t>
+            </a:r>
+          </a:p>
+          <a:p>
+            <a:pPr lvl="1">
+              <a:spcBef>
+                <a:spcPts val="0"/>
+              </a:spcBef>
+              <a:buSzPts val="2800"/>
+            </a:pPr>
+            <a:r>
+              <a:rPr lang="en-US" sz="1800" dirty="0"/>
+              <a:t>Run R script (row178), </a:t>
+            </a:r>
+            <a:r>
+              <a:rPr lang="en-US" sz="1800" dirty="0">
+                <a:latin typeface="+mn-lt"/>
+              </a:rPr>
+              <a:t>Where:</a:t>
+            </a:r>
+          </a:p>
+          <a:p>
+            <a:pPr marL="1600200" lvl="3" indent="-228600">
+              <a:spcBef>
+                <a:spcPts val="0"/>
+              </a:spcBef>
+              <a:buSzPts val="2800"/>
+            </a:pPr>
+            <a:r>
+              <a:rPr lang="en-US" sz="1600" dirty="0" err="1">
+                <a:latin typeface="+mn-lt"/>
+              </a:rPr>
+              <a:t>wg_bed_file</a:t>
+            </a:r>
+            <a:r>
+              <a:rPr lang="en-US" sz="1600" dirty="0">
+                <a:latin typeface="+mn-lt"/>
+              </a:rPr>
+              <a:t>: </a:t>
+            </a:r>
+            <a:r>
+              <a:rPr lang="en-US" sz="700" dirty="0">
+                <a:latin typeface="+mn-lt"/>
+                <a:hlinkClick r:id="rId4"/>
+              </a:rPr>
+              <a:t>https://raw.githubusercontent.com/guardant/ghpipeline/master/parameter_sets/Omni/v1.0/Omni1.0_probes.bed?token=AHUW5C2QMF7TPB3PCJFSHEDA4R6ZC</a:t>
+            </a:r>
+            <a:endParaRPr lang="en-US" sz="700" dirty="0">
+              <a:latin typeface="+mn-lt"/>
+            </a:endParaRPr>
+          </a:p>
+          <a:p>
+            <a:pPr marL="1600200" lvl="3" indent="-228600">
+              <a:spcBef>
+                <a:spcPts val="0"/>
+              </a:spcBef>
+              <a:buSzPts val="2800"/>
+            </a:pPr>
+            <a:r>
+              <a:rPr lang="en-US" sz="1600" dirty="0" err="1">
+                <a:latin typeface="+mn-lt"/>
+              </a:rPr>
+              <a:t>reference_file</a:t>
+            </a:r>
+            <a:r>
+              <a:rPr lang="en-US" sz="1600" dirty="0">
+                <a:latin typeface="+mn-lt"/>
+              </a:rPr>
+              <a:t> = /</a:t>
+            </a:r>
+            <a:r>
+              <a:rPr lang="en-US" sz="1600" dirty="0" err="1">
+                <a:latin typeface="+mn-lt"/>
+              </a:rPr>
+              <a:t>ghess</a:t>
+            </a:r>
+            <a:r>
+              <a:rPr lang="en-US" sz="1600" dirty="0">
+                <a:latin typeface="+mn-lt"/>
+              </a:rPr>
+              <a:t>/shared/ref/</a:t>
+            </a:r>
+            <a:r>
+              <a:rPr lang="en-US" sz="1600" dirty="0" err="1">
+                <a:latin typeface="+mn-lt"/>
+              </a:rPr>
+              <a:t>genome.fa</a:t>
+            </a:r>
+            <a:r>
+              <a:rPr lang="en-US" sz="1600" dirty="0">
+                <a:latin typeface="+mn-lt"/>
+              </a:rPr>
+              <a:t>.  (hg19)</a:t>
+            </a:r>
+          </a:p>
+          <a:p>
+            <a:pPr marL="1600200" lvl="3" indent="-228600">
+              <a:spcBef>
+                <a:spcPts val="0"/>
+              </a:spcBef>
+              <a:buSzPts val="2800"/>
+            </a:pPr>
+            <a:r>
+              <a:rPr lang="en-US" sz="1600" dirty="0" err="1">
+                <a:latin typeface="+mn-lt"/>
+              </a:rPr>
+              <a:t>max_size</a:t>
+            </a:r>
+            <a:r>
+              <a:rPr lang="en-US" sz="1600" dirty="0">
+                <a:latin typeface="+mn-lt"/>
+              </a:rPr>
+              <a:t> = 500 (molecule max size)</a:t>
+            </a:r>
+          </a:p>
+          <a:p>
+            <a:pPr lvl="3">
+              <a:spcBef>
+                <a:spcPts val="0"/>
+              </a:spcBef>
+              <a:buSzPts val="2800"/>
+            </a:pPr>
+            <a:r>
+              <a:rPr lang="en-US" sz="1600" dirty="0">
+                <a:latin typeface="+mn-lt"/>
+              </a:rPr>
+              <a:t>folder with molecule </a:t>
+            </a:r>
+            <a:r>
+              <a:rPr lang="en-US" sz="1600" dirty="0" err="1">
+                <a:latin typeface="+mn-lt"/>
+              </a:rPr>
+              <a:t>fiules</a:t>
+            </a:r>
+            <a:br>
+              <a:rPr lang="en-US" sz="1600" dirty="0">
+                <a:latin typeface="+mn-lt"/>
+              </a:rPr>
+            </a:br>
+            <a:r>
+              <a:rPr lang="en-US" sz="1100" dirty="0">
+                <a:latin typeface="+mn-lt"/>
+              </a:rPr>
+              <a:t>/</a:t>
+            </a:r>
+            <a:r>
+              <a:rPr lang="en-US" sz="1100" dirty="0" err="1">
+                <a:latin typeface="+mn-lt"/>
+              </a:rPr>
+              <a:t>ghds</a:t>
+            </a:r>
+            <a:r>
+              <a:rPr lang="en-US" sz="1100" dirty="0">
+                <a:latin typeface="+mn-lt"/>
+              </a:rPr>
+              <a:t>/groups/bioinformatics/02_DEVELOPMENT/210503_FUSION_FRAGMENTOMICS/</a:t>
+            </a:r>
+            <a:r>
+              <a:rPr lang="en-US" sz="1100" dirty="0" err="1">
+                <a:latin typeface="+mn-lt"/>
+              </a:rPr>
+              <a:t>clinical_samples</a:t>
+            </a:r>
+            <a:r>
+              <a:rPr lang="en-US" sz="1100" dirty="0">
+                <a:latin typeface="+mn-lt"/>
+              </a:rPr>
+              <a:t>/</a:t>
+            </a:r>
+            <a:r>
+              <a:rPr lang="en-US" sz="1100" dirty="0" err="1">
+                <a:latin typeface="+mn-lt"/>
+              </a:rPr>
+              <a:t>molecule_counts</a:t>
+            </a:r>
+            <a:endParaRPr lang="en-US" dirty="0">
+              <a:latin typeface="+mn-lt"/>
+            </a:endParaRPr>
+          </a:p>
+          <a:p>
             <a:pPr marL="228600" lvl="0" indent="-228600" algn="l" rtl="0">
               <a:lnSpc>
                 <a:spcPct val="90000"/>
@@ -5236,11 +5577,11 @@
               <a:rPr lang="en-US" dirty="0">
                 <a:latin typeface="+mn-lt"/>
               </a:rPr>
-              <a:t>Generate feature: </a:t>
-            </a:r>
-          </a:p>
-          <a:p>
-            <a:pPr marL="685800" lvl="1" indent="-228600">
+              <a:t>Data dimension reduction</a:t>
+            </a:r>
+          </a:p>
+          <a:p>
+            <a:pPr lvl="1">
               <a:spcBef>
                 <a:spcPts val="0"/>
               </a:spcBef>
@@ -5248,226 +5589,13 @@
             </a:pPr>
             <a:r>
               <a:rPr lang="en-US" dirty="0">
+                <a:highlight>
+                  <a:srgbClr val="FFFF00"/>
+                </a:highlight>
                 <a:latin typeface="+mn-lt"/>
               </a:rPr>
-              <a:t>Run R script (row178) and get a table of </a:t>
-            </a:r>
-            <a:r>
-              <a:rPr lang="en-US" dirty="0" err="1">
-                <a:latin typeface="+mn-lt"/>
-              </a:rPr>
-              <a:t>moleculesdistribution</a:t>
-            </a:r>
-            <a:r>
-              <a:rPr lang="en-US" dirty="0">
-                <a:latin typeface="+mn-lt"/>
-              </a:rPr>
-              <a:t> in bed format.  </a:t>
-            </a:r>
-            <a:r>
-              <a:rPr lang="en-US" sz="1400" dirty="0">
-                <a:latin typeface="+mn-lt"/>
-                <a:hlinkClick r:id="rId3"/>
-              </a:rPr>
-              <a:t>https://github.com/guardant/data_science/blob/master/02_DEVELOPMENT/210503_FUSION_FRAGMENTOMICS/00_prepareData.R</a:t>
-            </a:r>
-            <a:endParaRPr lang="en-US" sz="1400" dirty="0">
-              <a:latin typeface="+mn-lt"/>
-            </a:endParaRPr>
-          </a:p>
-          <a:p>
-            <a:pPr marL="1143000" lvl="2" indent="-228600">
-              <a:spcBef>
-                <a:spcPts val="0"/>
-              </a:spcBef>
-              <a:buSzPts val="2800"/>
-            </a:pPr>
-            <a:r>
-              <a:rPr lang="en-US" dirty="0">
-                <a:latin typeface="+mn-lt"/>
-              </a:rPr>
-              <a:t>Where:</a:t>
-            </a:r>
-          </a:p>
-          <a:p>
-            <a:pPr marL="1600200" lvl="3" indent="-228600">
-              <a:spcBef>
-                <a:spcPts val="0"/>
-              </a:spcBef>
-              <a:buSzPts val="2800"/>
-            </a:pPr>
-            <a:r>
-              <a:rPr lang="en-US" dirty="0" err="1">
-                <a:latin typeface="+mn-lt"/>
-              </a:rPr>
-              <a:t>wg_bed_file</a:t>
-            </a:r>
-            <a:r>
-              <a:rPr lang="en-US" dirty="0">
-                <a:latin typeface="+mn-lt"/>
-              </a:rPr>
-              <a:t>: </a:t>
-            </a:r>
-            <a:r>
-              <a:rPr lang="en-US" sz="800" dirty="0">
-                <a:latin typeface="+mn-lt"/>
-                <a:hlinkClick r:id="rId4"/>
-              </a:rPr>
-              <a:t>https://raw.githubusercontent.com/guardant/ghpipeline/master/parameter_sets/Omni/v1.0/Omni1.0_probes.bed?token=AHUW5C2QMF7TPB3PCJFSHEDA4R6ZC</a:t>
-            </a:r>
-            <a:endParaRPr lang="en-US" sz="800" dirty="0">
-              <a:latin typeface="+mn-lt"/>
-            </a:endParaRPr>
-          </a:p>
-          <a:p>
-            <a:pPr marL="1600200" lvl="3" indent="-228600">
-              <a:spcBef>
-                <a:spcPts val="0"/>
-              </a:spcBef>
-              <a:buSzPts val="2800"/>
-            </a:pPr>
-            <a:r>
-              <a:rPr lang="en-US" dirty="0" err="1">
-                <a:latin typeface="+mn-lt"/>
-              </a:rPr>
-              <a:t>reference_file</a:t>
-            </a:r>
-            <a:r>
-              <a:rPr lang="en-US" dirty="0">
-                <a:latin typeface="+mn-lt"/>
-              </a:rPr>
-              <a:t> = /</a:t>
-            </a:r>
-            <a:r>
-              <a:rPr lang="en-US" dirty="0" err="1">
-                <a:latin typeface="+mn-lt"/>
-              </a:rPr>
-              <a:t>ghess</a:t>
-            </a:r>
-            <a:r>
-              <a:rPr lang="en-US" dirty="0">
-                <a:latin typeface="+mn-lt"/>
-              </a:rPr>
-              <a:t>/shared/ref/</a:t>
-            </a:r>
-            <a:r>
-              <a:rPr lang="en-US" dirty="0" err="1">
-                <a:latin typeface="+mn-lt"/>
-              </a:rPr>
-              <a:t>genome.fa</a:t>
-            </a:r>
-            <a:r>
-              <a:rPr lang="en-US" dirty="0">
-                <a:latin typeface="+mn-lt"/>
-              </a:rPr>
-              <a:t>.  (hg19)</a:t>
-            </a:r>
-          </a:p>
-          <a:p>
-            <a:pPr marL="1600200" lvl="3" indent="-228600">
-              <a:spcBef>
-                <a:spcPts val="0"/>
-              </a:spcBef>
-              <a:buSzPts val="2800"/>
-            </a:pPr>
-            <a:r>
-              <a:rPr lang="en-US" dirty="0" err="1">
-                <a:latin typeface="+mn-lt"/>
-              </a:rPr>
-              <a:t>max_size</a:t>
-            </a:r>
-            <a:r>
-              <a:rPr lang="en-US" dirty="0">
-                <a:latin typeface="+mn-lt"/>
-              </a:rPr>
-              <a:t> = 500 (molecule max size)</a:t>
-            </a:r>
-          </a:p>
-          <a:p>
-            <a:pPr marL="1143000" lvl="2" indent="-228600">
-              <a:spcBef>
-                <a:spcPts val="0"/>
-              </a:spcBef>
-              <a:buSzPts val="2800"/>
-            </a:pPr>
-            <a:r>
-              <a:rPr lang="en-US" dirty="0">
-                <a:latin typeface="+mn-lt"/>
-              </a:rPr>
-              <a:t>folder with molecule </a:t>
-            </a:r>
-            <a:r>
-              <a:rPr lang="en-US" dirty="0" err="1">
-                <a:latin typeface="+mn-lt"/>
-              </a:rPr>
-              <a:t>fiules</a:t>
-            </a:r>
-            <a:br>
-              <a:rPr lang="en-US" dirty="0">
-                <a:latin typeface="+mn-lt"/>
-              </a:rPr>
-            </a:br>
-            <a:r>
-              <a:rPr lang="en-US" sz="1400" dirty="0">
-                <a:latin typeface="+mn-lt"/>
-              </a:rPr>
-              <a:t>/</a:t>
-            </a:r>
-            <a:r>
-              <a:rPr lang="en-US" sz="1400" dirty="0" err="1">
-                <a:latin typeface="+mn-lt"/>
-              </a:rPr>
-              <a:t>ghds</a:t>
-            </a:r>
-            <a:r>
-              <a:rPr lang="en-US" sz="1400" dirty="0">
-                <a:latin typeface="+mn-lt"/>
-              </a:rPr>
-              <a:t>/groups/bioinformatics/02_DEVELOPMENT/210503_FUSION_FRAGMENTOMICS/</a:t>
-            </a:r>
-            <a:r>
-              <a:rPr lang="en-US" sz="1400" dirty="0" err="1">
-                <a:latin typeface="+mn-lt"/>
-              </a:rPr>
-              <a:t>clinical_samples</a:t>
-            </a:r>
-            <a:r>
-              <a:rPr lang="en-US" sz="1400" dirty="0">
-                <a:latin typeface="+mn-lt"/>
-              </a:rPr>
-              <a:t>/</a:t>
-            </a:r>
-            <a:r>
-              <a:rPr lang="en-US" sz="1400" dirty="0" err="1">
-                <a:latin typeface="+mn-lt"/>
-              </a:rPr>
-              <a:t>molecule_counts</a:t>
-            </a:r>
-            <a:endParaRPr lang="en-US" sz="1400" dirty="0">
-              <a:latin typeface="+mn-lt"/>
-            </a:endParaRPr>
-          </a:p>
-          <a:p>
-            <a:pPr marL="1143000" lvl="2" indent="-228600">
-              <a:spcBef>
-                <a:spcPts val="0"/>
-              </a:spcBef>
-              <a:buSzPts val="2800"/>
-            </a:pPr>
-            <a:endParaRPr lang="en-US" sz="1400" dirty="0">
-              <a:latin typeface="+mn-lt"/>
-            </a:endParaRPr>
-          </a:p>
-          <a:p>
-            <a:pPr marL="685800" lvl="1" indent="-228600">
-              <a:spcBef>
-                <a:spcPts val="0"/>
-              </a:spcBef>
-              <a:buSzPts val="2800"/>
-            </a:pPr>
-            <a:endParaRPr lang="en-US" dirty="0">
-              <a:latin typeface="+mn-lt"/>
-            </a:endParaRPr>
+              <a:t>Need samples of tumor &amp; non-tumor</a:t>
+            </a:r>
           </a:p>
           <a:p>
             <a:pPr marL="228600" lvl="0" indent="-228600" algn="l" rtl="0">
@@ -5484,10 +5612,8 @@
               <a:buChar char="•"/>
             </a:pPr>
             <a:r>
-              <a:rPr lang="en-US" dirty="0">
-                <a:latin typeface="+mn-lt"/>
-              </a:rPr>
-              <a:t>Motivation</a:t>
+              <a:rPr lang="en-US" dirty="0"/>
+              <a:t>Build Predictor</a:t>
             </a:r>
             <a:endParaRPr dirty="0">
               <a:latin typeface="+mn-lt"/>
@@ -5557,15 +5683,28 @@
             <p:ph type="title"/>
           </p:nvPr>
         </p:nvSpPr>
-        <p:spPr/>
+        <p:spPr>
+          <a:xfrm>
+            <a:off x="622657" y="231949"/>
+            <a:ext cx="10515600" cy="1325563"/>
+          </a:xfrm>
+        </p:spPr>
         <p:txBody>
           <a:bodyPr/>
           <a:lstStyle/>
           <a:p>
             <a:r>
               <a:rPr lang="en-US" dirty="0"/>
+              <a:t>Fragment Size Distribution</a:t>
+            </a:r>
+            <a:br>
+              <a:rPr lang="en-US" dirty="0"/>
+            </a:br>
+            <a:r>
+              <a:rPr lang="en-US" sz="3200" dirty="0"/>
               <a:t>Test on A035043401.molecule_table.tsv</a:t>
             </a:r>
+            <a:endParaRPr lang="en-US" dirty="0"/>
           </a:p>
         </p:txBody>
       </p:sp>
@@ -5584,13 +5723,13 @@
           <p:nvPr>
             <p:extLst>
               <p:ext uri="{D42A27DB-BD31-4B8C-83A1-F6EECF244321}">
-                <p14:modId xmlns:p14="http://schemas.microsoft.com/office/powerpoint/2010/main" val="1466424674"/>
+                <p14:modId xmlns:p14="http://schemas.microsoft.com/office/powerpoint/2010/main" val="3918082971"/>
               </p:ext>
             </p:extLst>
           </p:nvPr>
         </p:nvGraphicFramePr>
         <p:xfrm>
-          <a:off x="2372611" y="1690688"/>
+          <a:off x="2095500" y="1699865"/>
           <a:ext cx="6604000" cy="2204085"/>
         </p:xfrm>
         <a:graphic>
@@ -5826,12 +5965,12 @@
                     <a:p>
                       <a:pPr algn="l" fontAlgn="b"/>
                       <a:r>
-                        <a:rPr lang="en-US" sz="1200" u="none" strike="noStrike">
+                        <a:rPr lang="en-US" sz="1200" u="none" strike="noStrike" dirty="0" err="1">
                           <a:effectLst/>
                         </a:rPr>
                         <a:t>bin_idx</a:t>
                       </a:r>
-                      <a:endParaRPr lang="en-US" sz="1200" b="0" i="0" u="none" strike="noStrike">
+                      <a:endParaRPr lang="en-US" sz="1200" b="0" i="0" u="none" strike="noStrike" dirty="0">
                         <a:solidFill>
                           <a:srgbClr val="000000"/>
                         </a:solidFill>
@@ -6047,12 +6186,12 @@
                     <a:p>
                       <a:pPr algn="r" fontAlgn="b"/>
                       <a:r>
-                        <a:rPr lang="en-US" sz="1200" u="none" strike="noStrike">
+                        <a:rPr lang="en-US" sz="1200" u="none" strike="noStrike" dirty="0">
                           <a:effectLst/>
                         </a:rPr>
                         <a:t>1</a:t>
                       </a:r>
-                      <a:endParaRPr lang="en-US" sz="1200" b="0" i="0" u="none" strike="noStrike">
+                      <a:endParaRPr lang="en-US" sz="1200" b="0" i="0" u="none" strike="noStrike" dirty="0">
                         <a:solidFill>
                           <a:srgbClr val="000000"/>
                         </a:solidFill>
@@ -7163,12 +7302,12 @@
                     <a:p>
                       <a:pPr algn="r" fontAlgn="b"/>
                       <a:r>
-                        <a:rPr lang="en-US" sz="1200" u="none" strike="noStrike">
+                        <a:rPr lang="en-US" sz="1200" u="none" strike="noStrike" dirty="0">
                           <a:effectLst/>
                         </a:rPr>
                         <a:t>0</a:t>
                       </a:r>
-                      <a:endParaRPr lang="en-US" sz="1200" b="0" i="0" u="none" strike="noStrike">
+                      <a:endParaRPr lang="en-US" sz="1200" b="0" i="0" u="none" strike="noStrike" dirty="0">
                         <a:solidFill>
                           <a:srgbClr val="000000"/>
                         </a:solidFill>
@@ -7571,10 +7710,218 @@
           </a:graphicData>
         </a:graphic>
       </p:graphicFrame>
+      <p:pic>
+        <p:nvPicPr>
+          <p:cNvPr id="8" name="Picture 7">
+            <a:extLst>
+              <a:ext uri="{FF2B5EF4-FFF2-40B4-BE49-F238E27FC236}">
+                <a16:creationId xmlns:a16="http://schemas.microsoft.com/office/drawing/2014/main" id="{91489256-B654-1743-9570-EE4B62E66A27}"/>
+              </a:ext>
+            </a:extLst>
+          </p:cNvPr>
+          <p:cNvPicPr>
+            <a:picLocks noChangeAspect="1"/>
+          </p:cNvPicPr>
+          <p:nvPr/>
+        </p:nvPicPr>
+        <p:blipFill>
+          <a:blip r:embed="rId3"/>
+          <a:stretch>
+            <a:fillRect/>
+          </a:stretch>
+        </p:blipFill>
+        <p:spPr>
+          <a:xfrm>
+            <a:off x="2095500" y="4502786"/>
+            <a:ext cx="4000500" cy="1435100"/>
+          </a:xfrm>
+          <a:prstGeom prst="rect">
+            <a:avLst/>
+          </a:prstGeom>
+        </p:spPr>
+      </p:pic>
+      <p:sp>
+        <p:nvSpPr>
+          <p:cNvPr id="9" name="Rectangle 8">
+            <a:extLst>
+              <a:ext uri="{FF2B5EF4-FFF2-40B4-BE49-F238E27FC236}">
+                <a16:creationId xmlns:a16="http://schemas.microsoft.com/office/drawing/2014/main" id="{0D52A5D7-26BD-2040-87C3-FC0093D6B11C}"/>
+              </a:ext>
+            </a:extLst>
+          </p:cNvPr>
+          <p:cNvSpPr/>
+          <p:nvPr/>
+        </p:nvSpPr>
+        <p:spPr>
+          <a:xfrm>
+            <a:off x="622657" y="4982646"/>
+            <a:ext cx="686406" cy="369332"/>
+          </a:xfrm>
+          <a:prstGeom prst="rect">
+            <a:avLst/>
+          </a:prstGeom>
+        </p:spPr>
+        <p:txBody>
+          <a:bodyPr wrap="none">
+            <a:spAutoFit/>
+          </a:bodyPr>
+          <a:lstStyle/>
+          <a:p>
+            <a:r>
+              <a:rPr lang="en-US" dirty="0"/>
+              <a:t>Done</a:t>
+            </a:r>
+          </a:p>
+        </p:txBody>
+      </p:sp>
+      <p:pic>
+        <p:nvPicPr>
+          <p:cNvPr id="10" name="Picture 9">
+            <a:extLst>
+              <a:ext uri="{FF2B5EF4-FFF2-40B4-BE49-F238E27FC236}">
+                <a16:creationId xmlns:a16="http://schemas.microsoft.com/office/drawing/2014/main" id="{0EA4E293-2FB3-7A49-B5E5-14B2E53291DD}"/>
+              </a:ext>
+            </a:extLst>
+          </p:cNvPr>
+          <p:cNvPicPr>
+            <a:picLocks noChangeAspect="1"/>
+          </p:cNvPicPr>
+          <p:nvPr/>
+        </p:nvPicPr>
+        <p:blipFill>
+          <a:blip r:embed="rId4"/>
+          <a:stretch>
+            <a:fillRect/>
+          </a:stretch>
+        </p:blipFill>
+        <p:spPr>
+          <a:xfrm>
+            <a:off x="6198919" y="4056092"/>
+            <a:ext cx="2968033" cy="2222440"/>
+          </a:xfrm>
+          <a:prstGeom prst="rect">
+            <a:avLst/>
+          </a:prstGeom>
+        </p:spPr>
+      </p:pic>
+      <p:sp>
+        <p:nvSpPr>
+          <p:cNvPr id="11" name="Rectangle 10">
+            <a:extLst>
+              <a:ext uri="{FF2B5EF4-FFF2-40B4-BE49-F238E27FC236}">
+                <a16:creationId xmlns:a16="http://schemas.microsoft.com/office/drawing/2014/main" id="{1F299D6B-F373-9245-BD34-71BC7DBAC2DE}"/>
+              </a:ext>
+            </a:extLst>
+          </p:cNvPr>
+          <p:cNvSpPr/>
+          <p:nvPr/>
+        </p:nvSpPr>
+        <p:spPr>
+          <a:xfrm>
+            <a:off x="636704" y="2406360"/>
+            <a:ext cx="673069" cy="369332"/>
+          </a:xfrm>
+          <a:prstGeom prst="rect">
+            <a:avLst/>
+          </a:prstGeom>
+        </p:spPr>
+        <p:txBody>
+          <a:bodyPr wrap="none">
+            <a:spAutoFit/>
+          </a:bodyPr>
+          <a:lstStyle/>
+          <a:p>
+            <a:r>
+              <a:rPr lang="en-US" dirty="0"/>
+              <a:t>From</a:t>
+            </a:r>
+          </a:p>
+        </p:txBody>
+      </p:sp>
     </p:spTree>
     <p:extLst>
       <p:ext uri="{BB962C8B-B14F-4D97-AF65-F5344CB8AC3E}">
         <p14:creationId xmlns:p14="http://schemas.microsoft.com/office/powerpoint/2010/main" val="3077201713"/>
+      </p:ext>
+    </p:extLst>
+  </p:cSld>
+  <p:clrMapOvr>
+    <a:masterClrMapping/>
+  </p:clrMapOvr>
+</p:sld>
+</file>
+
+<file path=ppt/slides/slide5.xml><?xml version="1.0" encoding="utf-8"?>
+<p:sld xmlns:a="http://schemas.openxmlformats.org/drawingml/2006/main" xmlns:r="http://schemas.openxmlformats.org/officeDocument/2006/relationships" xmlns:p="http://schemas.openxmlformats.org/presentationml/2006/main">
+  <p:cSld>
+    <p:spTree>
+      <p:nvGrpSpPr>
+        <p:cNvPr id="1" name=""/>
+        <p:cNvGrpSpPr/>
+        <p:nvPr/>
+      </p:nvGrpSpPr>
+      <p:grpSpPr>
+        <a:xfrm>
+          <a:off x="0" y="0"/>
+          <a:ext cx="0" cy="0"/>
+          <a:chOff x="0" y="0"/>
+          <a:chExt cx="0" cy="0"/>
+        </a:xfrm>
+      </p:grpSpPr>
+      <p:sp>
+        <p:nvSpPr>
+          <p:cNvPr id="2" name="Title 1">
+            <a:extLst>
+              <a:ext uri="{FF2B5EF4-FFF2-40B4-BE49-F238E27FC236}">
+                <a16:creationId xmlns:a16="http://schemas.microsoft.com/office/drawing/2014/main" id="{85BC5448-F0BF-FB46-AF74-335F0E9339B3}"/>
+              </a:ext>
+            </a:extLst>
+          </p:cNvPr>
+          <p:cNvSpPr>
+            <a:spLocks noGrp="1"/>
+          </p:cNvSpPr>
+          <p:nvPr>
+            <p:ph type="title"/>
+          </p:nvPr>
+        </p:nvSpPr>
+        <p:spPr/>
+        <p:txBody>
+          <a:bodyPr/>
+          <a:lstStyle/>
+          <a:p>
+            <a:endParaRPr lang="en-US"/>
+          </a:p>
+        </p:txBody>
+      </p:sp>
+      <p:sp>
+        <p:nvSpPr>
+          <p:cNvPr id="3" name="Content Placeholder 2">
+            <a:extLst>
+              <a:ext uri="{FF2B5EF4-FFF2-40B4-BE49-F238E27FC236}">
+                <a16:creationId xmlns:a16="http://schemas.microsoft.com/office/drawing/2014/main" id="{5A21FB3E-D010-EC41-9379-873B681DFD44}"/>
+              </a:ext>
+            </a:extLst>
+          </p:cNvPr>
+          <p:cNvSpPr>
+            <a:spLocks noGrp="1"/>
+          </p:cNvSpPr>
+          <p:nvPr>
+            <p:ph idx="1"/>
+          </p:nvPr>
+        </p:nvSpPr>
+        <p:spPr/>
+        <p:txBody>
+          <a:bodyPr/>
+          <a:lstStyle/>
+          <a:p>
+            <a:endParaRPr lang="en-US"/>
+          </a:p>
+        </p:txBody>
+      </p:sp>
+    </p:spTree>
+    <p:extLst>
+      <p:ext uri="{BB962C8B-B14F-4D97-AF65-F5344CB8AC3E}">
+        <p14:creationId xmlns:p14="http://schemas.microsoft.com/office/powerpoint/2010/main" val="3884620667"/>
       </p:ext>
     </p:extLst>
   </p:cSld>

</xml_diff>